<commit_message>
Marston staff meeting presentation (12.11.18).
</commit_message>
<xml_diff>
--- a/_library/library_as_brand.pptx
+++ b/_library/library_as_brand.pptx
@@ -9,11 +9,11 @@
   </p:notesMasterIdLst>
   <p:sldIdLst>
     <p:sldId id="256" r:id="rId2"/>
-    <p:sldId id="257" r:id="rId3"/>
-    <p:sldId id="258" r:id="rId4"/>
+    <p:sldId id="258" r:id="rId3"/>
+    <p:sldId id="257" r:id="rId4"/>
     <p:sldId id="259" r:id="rId5"/>
-    <p:sldId id="262" r:id="rId6"/>
-    <p:sldId id="261" r:id="rId7"/>
+    <p:sldId id="261" r:id="rId6"/>
+    <p:sldId id="262" r:id="rId7"/>
     <p:sldId id="263" r:id="rId8"/>
     <p:sldId id="264" r:id="rId9"/>
     <p:sldId id="260" r:id="rId10"/>
@@ -209,7 +209,7 @@
           <a:p>
             <a:fld id="{D5926BEC-91DB-4675-AE9F-EC6F43E32563}" type="datetimeFigureOut">
               <a:rPr lang="en-US" smtClean="0"/>
-              <a:t>11/12/2018</a:t>
+              <a:t>12/11/2018</a:t>
             </a:fld>
             <a:endParaRPr lang="en-US"/>
           </a:p>
@@ -523,20 +523,11 @@
           <a:p>
             <a:r>
               <a:rPr lang="en-US" dirty="0" smtClean="0"/>
-              <a:t>Each of us is a brand.  Marston</a:t>
+              <a:t>The UVP is the</a:t>
             </a:r>
             <a:r>
               <a:rPr lang="en-US" baseline="0" dirty="0" smtClean="0"/>
-              <a:t>, then, is a family of brands.  Obviously, our individual brands ought to support and magnify the library’s overarching brand.  But that’s hard to do if the library lacks a clearly defined brand.  </a:t>
-            </a:r>
-          </a:p>
-          <a:p>
-            <a:endParaRPr lang="en-US" baseline="0" dirty="0" smtClean="0"/>
-          </a:p>
-          <a:p>
-            <a:r>
-              <a:rPr lang="en-US" baseline="0" dirty="0" smtClean="0"/>
-              <a:t>Think of the library as a professional service firm – a law firm.  What matters to a PSF?  Billable hours…</a:t>
+              <a:t> starting point…</a:t>
             </a:r>
             <a:endParaRPr lang="en-US" dirty="0"/>
           </a:p>
@@ -559,7 +550,7 @@
           <a:p>
             <a:fld id="{69771C7D-C45A-4918-80C1-CE7F4A88DA47}" type="slidenum">
               <a:rPr lang="en-US" smtClean="0"/>
-              <a:t>2</a:t>
+              <a:t>1</a:t>
             </a:fld>
             <a:endParaRPr lang="en-US"/>
           </a:p>
@@ -568,7 +559,7 @@
     </p:spTree>
     <p:extLst>
       <p:ext uri="{BB962C8B-B14F-4D97-AF65-F5344CB8AC3E}">
-        <p14:creationId xmlns:p14="http://schemas.microsoft.com/office/powerpoint/2010/main" val="4117204921"/>
+        <p14:creationId xmlns:p14="http://schemas.microsoft.com/office/powerpoint/2010/main" val="4091837369"/>
       </p:ext>
     </p:extLst>
   </p:cSld>
@@ -622,14 +613,22 @@
           <a:bodyPr/>
           <a:lstStyle/>
           <a:p>
-            <a:r>
-              <a:rPr lang="en-US" dirty="0" smtClean="0"/>
-              <a:t>Every word in my UVP</a:t>
-            </a:r>
-            <a:r>
-              <a:rPr lang="en-US" baseline="0" dirty="0" smtClean="0"/>
-              <a:t> is important.  Defining one’s value is HARD.</a:t>
-            </a:r>
+            <a:pPr marL="0" indent="0" algn="l">
+              <a:buNone/>
+            </a:pPr>
+            <a:r>
+              <a:rPr lang="en-US" sz="1200" kern="1200" dirty="0" smtClean="0">
+                <a:solidFill>
+                  <a:schemeClr val="tx1"/>
+                </a:solidFill>
+                <a:latin typeface="+mn-lt"/>
+                <a:ea typeface="+mn-ea"/>
+                <a:cs typeface="+mn-cs"/>
+              </a:rPr>
+              <a:t>A unique value proposition (UVP) is a clear (concise) statement that describes the benefit you offer, how you solve your client’s needs and what distinguishes you from the competition.</a:t>
+            </a:r>
+          </a:p>
+          <a:p>
             <a:endParaRPr lang="en-US" dirty="0"/>
           </a:p>
         </p:txBody>
@@ -651,7 +650,7 @@
           <a:p>
             <a:fld id="{69771C7D-C45A-4918-80C1-CE7F4A88DA47}" type="slidenum">
               <a:rPr lang="en-US" smtClean="0"/>
-              <a:t>4</a:t>
+              <a:t>2</a:t>
             </a:fld>
             <a:endParaRPr lang="en-US"/>
           </a:p>
@@ -660,7 +659,7 @@
     </p:spTree>
     <p:extLst>
       <p:ext uri="{BB962C8B-B14F-4D97-AF65-F5344CB8AC3E}">
-        <p14:creationId xmlns:p14="http://schemas.microsoft.com/office/powerpoint/2010/main" val="3825515129"/>
+        <p14:creationId xmlns:p14="http://schemas.microsoft.com/office/powerpoint/2010/main" val="2099031185"/>
       </p:ext>
     </p:extLst>
   </p:cSld>
@@ -714,7 +713,24 @@
           <a:bodyPr/>
           <a:lstStyle/>
           <a:p>
-            <a:endParaRPr lang="en-US"/>
+            <a:r>
+              <a:rPr lang="en-US" dirty="0" smtClean="0"/>
+              <a:t>Each of us is a brand.  Marston</a:t>
+            </a:r>
+            <a:r>
+              <a:rPr lang="en-US" baseline="0" dirty="0" smtClean="0"/>
+              <a:t>, then, is a family of brands.  Obviously, our individual brands ought to support and magnify the library’s overarching brand.  But that’s hard to do if the library lacks a clearly defined brand.  </a:t>
+            </a:r>
+          </a:p>
+          <a:p>
+            <a:endParaRPr lang="en-US" baseline="0" dirty="0" smtClean="0"/>
+          </a:p>
+          <a:p>
+            <a:r>
+              <a:rPr lang="en-US" baseline="0" dirty="0" smtClean="0"/>
+              <a:t>Think of the library as a professional service firm – a law firm.  What matters to a PSF?  Billable hours…</a:t>
+            </a:r>
+            <a:endParaRPr lang="en-US" dirty="0"/>
           </a:p>
         </p:txBody>
       </p:sp>
@@ -735,7 +751,7 @@
           <a:p>
             <a:fld id="{69771C7D-C45A-4918-80C1-CE7F4A88DA47}" type="slidenum">
               <a:rPr lang="en-US" smtClean="0"/>
-              <a:t>5</a:t>
+              <a:t>3</a:t>
             </a:fld>
             <a:endParaRPr lang="en-US"/>
           </a:p>
@@ -744,7 +760,7 @@
     </p:spTree>
     <p:extLst>
       <p:ext uri="{BB962C8B-B14F-4D97-AF65-F5344CB8AC3E}">
-        <p14:creationId xmlns:p14="http://schemas.microsoft.com/office/powerpoint/2010/main" val="1747547121"/>
+        <p14:creationId xmlns:p14="http://schemas.microsoft.com/office/powerpoint/2010/main" val="4117204921"/>
       </p:ext>
     </p:extLst>
   </p:cSld>
@@ -798,26 +814,17 @@
           <a:bodyPr/>
           <a:lstStyle/>
           <a:p>
-            <a:pPr marL="0" marR="0" lvl="0" indent="0" algn="l" defTabSz="914400" rtl="0" eaLnBrk="1" fontAlgn="auto" latinLnBrk="0" hangingPunct="1">
-              <a:lnSpc>
-                <a:spcPct val="100000"/>
-              </a:lnSpc>
-              <a:spcBef>
-                <a:spcPts val="0"/>
-              </a:spcBef>
-              <a:spcAft>
-                <a:spcPts val="0"/>
-              </a:spcAft>
-              <a:buClrTx/>
-              <a:buSzTx/>
-              <a:buFontTx/>
-              <a:buNone/>
-              <a:tabLst/>
-              <a:defRPr/>
-            </a:pPr>
+            <a:r>
+              <a:rPr lang="en-US" dirty="0" smtClean="0"/>
+              <a:t>Every word in my UVP</a:t>
+            </a:r>
             <a:r>
               <a:rPr lang="en-US" baseline="0" dirty="0" smtClean="0"/>
-              <a:t>Focus on a single segment of the market.  For example, my focus is PI’s and undergraduates.  </a:t>
+              <a:t> is important.  Defining one’s value is HARD</a:t>
+            </a:r>
+            <a:r>
+              <a:rPr lang="en-US" baseline="0" dirty="0" smtClean="0"/>
+              <a:t>.</a:t>
             </a:r>
           </a:p>
           <a:p>
@@ -826,26 +833,9 @@
           <a:p>
             <a:r>
               <a:rPr lang="en-US" baseline="0" dirty="0" smtClean="0"/>
-              <a:t>LISTEN, LISTEN...  Identify the problem / pain.  Do a thorough job defining/understanding the problem.</a:t>
-            </a:r>
-          </a:p>
-          <a:p>
-            <a:endParaRPr lang="en-US" baseline="0" dirty="0" smtClean="0"/>
-          </a:p>
-          <a:p>
-            <a:r>
-              <a:rPr lang="en-US" baseline="0" dirty="0" smtClean="0"/>
-              <a:t>Identify niches where there’s no competition.</a:t>
-            </a:r>
-          </a:p>
-          <a:p>
-            <a:endParaRPr lang="en-US" baseline="0" dirty="0" smtClean="0"/>
-          </a:p>
-          <a:p>
-            <a:r>
-              <a:rPr lang="en-US" baseline="0" dirty="0" smtClean="0"/>
-              <a:t>Resist the urge to build before understanding.  (Field of Dreams)</a:t>
-            </a:r>
+              <a:t>So what are the steps to arriving at a UVP?</a:t>
+            </a:r>
+            <a:endParaRPr lang="en-US" dirty="0"/>
           </a:p>
         </p:txBody>
       </p:sp>
@@ -866,7 +856,7 @@
           <a:p>
             <a:fld id="{69771C7D-C45A-4918-80C1-CE7F4A88DA47}" type="slidenum">
               <a:rPr lang="en-US" smtClean="0"/>
-              <a:t>6</a:t>
+              <a:t>4</a:t>
             </a:fld>
             <a:endParaRPr lang="en-US"/>
           </a:p>
@@ -875,7 +865,7 @@
     </p:spTree>
     <p:extLst>
       <p:ext uri="{BB962C8B-B14F-4D97-AF65-F5344CB8AC3E}">
-        <p14:creationId xmlns:p14="http://schemas.microsoft.com/office/powerpoint/2010/main" val="286102215"/>
+        <p14:creationId xmlns:p14="http://schemas.microsoft.com/office/powerpoint/2010/main" val="3825515129"/>
       </p:ext>
     </p:extLst>
   </p:cSld>
@@ -929,33 +919,101 @@
           <a:bodyPr/>
           <a:lstStyle/>
           <a:p>
-            <a:r>
-              <a:rPr lang="en-US" dirty="0" smtClean="0"/>
-              <a:t>Alignment happens at two levels.  </a:t>
-            </a:r>
-          </a:p>
-          <a:p>
-            <a:endParaRPr lang="en-US" dirty="0" smtClean="0"/>
-          </a:p>
-          <a:p>
-            <a:r>
-              <a:rPr lang="en-US" dirty="0" smtClean="0"/>
-              <a:t>1.</a:t>
-            </a:r>
+            <a:pPr marL="0" marR="0" lvl="0" indent="0" algn="l" defTabSz="914400" rtl="0" eaLnBrk="1" fontAlgn="auto" latinLnBrk="0" hangingPunct="1">
+              <a:lnSpc>
+                <a:spcPct val="100000"/>
+              </a:lnSpc>
+              <a:spcBef>
+                <a:spcPts val="0"/>
+              </a:spcBef>
+              <a:spcAft>
+                <a:spcPts val="0"/>
+              </a:spcAft>
+              <a:buClrTx/>
+              <a:buSzTx/>
+              <a:buFontTx/>
+              <a:buNone/>
+              <a:tabLst/>
+              <a:defRPr/>
+            </a:pPr>
             <a:r>
               <a:rPr lang="en-US" baseline="0" dirty="0" smtClean="0"/>
-              <a:t> Your UVP ought to align with what the university deems important.  So what does UF value?</a:t>
-            </a:r>
-          </a:p>
-          <a:p>
+              <a:t>Also known as segmentation…</a:t>
+            </a:r>
+          </a:p>
+          <a:p>
+            <a:pPr marL="0" marR="0" lvl="0" indent="0" algn="l" defTabSz="914400" rtl="0" eaLnBrk="1" fontAlgn="auto" latinLnBrk="0" hangingPunct="1">
+              <a:lnSpc>
+                <a:spcPct val="100000"/>
+              </a:lnSpc>
+              <a:spcBef>
+                <a:spcPts val="0"/>
+              </a:spcBef>
+              <a:spcAft>
+                <a:spcPts val="0"/>
+              </a:spcAft>
+              <a:buClrTx/>
+              <a:buSzTx/>
+              <a:buFontTx/>
+              <a:buNone/>
+              <a:tabLst/>
+              <a:defRPr/>
+            </a:pPr>
             <a:endParaRPr lang="en-US" baseline="0" dirty="0" smtClean="0"/>
           </a:p>
           <a:p>
+            <a:pPr marL="0" marR="0" lvl="0" indent="0" algn="l" defTabSz="914400" rtl="0" eaLnBrk="1" fontAlgn="auto" latinLnBrk="0" hangingPunct="1">
+              <a:lnSpc>
+                <a:spcPct val="100000"/>
+              </a:lnSpc>
+              <a:spcBef>
+                <a:spcPts val="0"/>
+              </a:spcBef>
+              <a:spcAft>
+                <a:spcPts val="0"/>
+              </a:spcAft>
+              <a:buClrTx/>
+              <a:buSzTx/>
+              <a:buFontTx/>
+              <a:buNone/>
+              <a:tabLst/>
+              <a:defRPr/>
+            </a:pPr>
             <a:r>
               <a:rPr lang="en-US" baseline="0" dirty="0" smtClean="0"/>
-              <a:t>2. Only accept client’s whose problem aligns with your UVP.  Refer, Refer, Refer</a:t>
-            </a:r>
-            <a:endParaRPr lang="en-US" dirty="0"/>
+              <a:t>Focus </a:t>
+            </a:r>
+            <a:r>
+              <a:rPr lang="en-US" baseline="0" dirty="0" smtClean="0"/>
+              <a:t>on a single segment of the market.  For example, my focus is PI’s and undergraduates.  </a:t>
+            </a:r>
+          </a:p>
+          <a:p>
+            <a:endParaRPr lang="en-US" baseline="0" dirty="0" smtClean="0"/>
+          </a:p>
+          <a:p>
+            <a:r>
+              <a:rPr lang="en-US" baseline="0" dirty="0" smtClean="0"/>
+              <a:t>LISTEN, LISTEN...  Identify the problem / pain.  Do a thorough job defining/understanding the problem.</a:t>
+            </a:r>
+          </a:p>
+          <a:p>
+            <a:endParaRPr lang="en-US" baseline="0" dirty="0" smtClean="0"/>
+          </a:p>
+          <a:p>
+            <a:r>
+              <a:rPr lang="en-US" baseline="0" dirty="0" smtClean="0"/>
+              <a:t>Identify niches where there’s no competition.</a:t>
+            </a:r>
+          </a:p>
+          <a:p>
+            <a:endParaRPr lang="en-US" baseline="0" dirty="0" smtClean="0"/>
+          </a:p>
+          <a:p>
+            <a:r>
+              <a:rPr lang="en-US" baseline="0" dirty="0" smtClean="0"/>
+              <a:t>Resist the urge to build before understanding.  (Field of Dreams)</a:t>
+            </a:r>
           </a:p>
         </p:txBody>
       </p:sp>
@@ -976,7 +1034,7 @@
           <a:p>
             <a:fld id="{69771C7D-C45A-4918-80C1-CE7F4A88DA47}" type="slidenum">
               <a:rPr lang="en-US" smtClean="0"/>
-              <a:t>7</a:t>
+              <a:t>5</a:t>
             </a:fld>
             <a:endParaRPr lang="en-US"/>
           </a:p>
@@ -985,7 +1043,7 @@
     </p:spTree>
     <p:extLst>
       <p:ext uri="{BB962C8B-B14F-4D97-AF65-F5344CB8AC3E}">
-        <p14:creationId xmlns:p14="http://schemas.microsoft.com/office/powerpoint/2010/main" val="2872950664"/>
+        <p14:creationId xmlns:p14="http://schemas.microsoft.com/office/powerpoint/2010/main" val="286102215"/>
       </p:ext>
     </p:extLst>
   </p:cSld>
@@ -1039,14 +1097,6 @@
           <a:bodyPr/>
           <a:lstStyle/>
           <a:p>
-            <a:r>
-              <a:rPr lang="en-US" dirty="0" smtClean="0"/>
-              <a:t>Many organizations start with the channel</a:t>
-            </a:r>
-            <a:r>
-              <a:rPr lang="en-US" baseline="0" dirty="0" smtClean="0"/>
-              <a:t> – the medium through which they communicate.  Everybody’s doing social media, we need to be doing something too!  </a:t>
-            </a:r>
             <a:endParaRPr lang="en-US" dirty="0"/>
           </a:p>
         </p:txBody>
@@ -1068,7 +1118,7 @@
           <a:p>
             <a:fld id="{69771C7D-C45A-4918-80C1-CE7F4A88DA47}" type="slidenum">
               <a:rPr lang="en-US" smtClean="0"/>
-              <a:t>8</a:t>
+              <a:t>6</a:t>
             </a:fld>
             <a:endParaRPr lang="en-US"/>
           </a:p>
@@ -1077,7 +1127,7 @@
     </p:spTree>
     <p:extLst>
       <p:ext uri="{BB962C8B-B14F-4D97-AF65-F5344CB8AC3E}">
-        <p14:creationId xmlns:p14="http://schemas.microsoft.com/office/powerpoint/2010/main" val="2524366179"/>
+        <p14:creationId xmlns:p14="http://schemas.microsoft.com/office/powerpoint/2010/main" val="1747547121"/>
       </p:ext>
     </p:extLst>
   </p:cSld>
@@ -1133,6 +1183,208 @@
           <a:p>
             <a:r>
               <a:rPr lang="en-US" dirty="0" smtClean="0"/>
+              <a:t>Alignment happens at two levels.  </a:t>
+            </a:r>
+          </a:p>
+          <a:p>
+            <a:endParaRPr lang="en-US" dirty="0" smtClean="0"/>
+          </a:p>
+          <a:p>
+            <a:r>
+              <a:rPr lang="en-US" dirty="0" smtClean="0"/>
+              <a:t>1.</a:t>
+            </a:r>
+            <a:r>
+              <a:rPr lang="en-US" baseline="0" dirty="0" smtClean="0"/>
+              <a:t> Your UVP ought to align with what the university deems important.  So what does UF value?</a:t>
+            </a:r>
+          </a:p>
+          <a:p>
+            <a:endParaRPr lang="en-US" baseline="0" dirty="0" smtClean="0"/>
+          </a:p>
+          <a:p>
+            <a:r>
+              <a:rPr lang="en-US" baseline="0" dirty="0" smtClean="0"/>
+              <a:t>2. Only accept client’s whose problem aligns with your UVP.  Refer, Refer, Refer</a:t>
+            </a:r>
+            <a:endParaRPr lang="en-US" dirty="0"/>
+          </a:p>
+        </p:txBody>
+      </p:sp>
+      <p:sp>
+        <p:nvSpPr>
+          <p:cNvPr id="4" name="Slide Number Placeholder 3"/>
+          <p:cNvSpPr>
+            <a:spLocks noGrp="1"/>
+          </p:cNvSpPr>
+          <p:nvPr>
+            <p:ph type="sldNum" sz="quarter" idx="10"/>
+          </p:nvPr>
+        </p:nvSpPr>
+        <p:spPr/>
+        <p:txBody>
+          <a:bodyPr/>
+          <a:lstStyle/>
+          <a:p>
+            <a:fld id="{69771C7D-C45A-4918-80C1-CE7F4A88DA47}" type="slidenum">
+              <a:rPr lang="en-US" smtClean="0"/>
+              <a:t>7</a:t>
+            </a:fld>
+            <a:endParaRPr lang="en-US"/>
+          </a:p>
+        </p:txBody>
+      </p:sp>
+    </p:spTree>
+    <p:extLst>
+      <p:ext uri="{BB962C8B-B14F-4D97-AF65-F5344CB8AC3E}">
+        <p14:creationId xmlns:p14="http://schemas.microsoft.com/office/powerpoint/2010/main" val="2872950664"/>
+      </p:ext>
+    </p:extLst>
+  </p:cSld>
+  <p:clrMapOvr>
+    <a:masterClrMapping/>
+  </p:clrMapOvr>
+</p:notes>
+</file>
+
+<file path=ppt/notesSlides/notesSlide8.xml><?xml version="1.0" encoding="utf-8"?>
+<p:notes xmlns:a="http://schemas.openxmlformats.org/drawingml/2006/main" xmlns:r="http://schemas.openxmlformats.org/officeDocument/2006/relationships" xmlns:p="http://schemas.openxmlformats.org/presentationml/2006/main">
+  <p:cSld>
+    <p:spTree>
+      <p:nvGrpSpPr>
+        <p:cNvPr id="1" name=""/>
+        <p:cNvGrpSpPr/>
+        <p:nvPr/>
+      </p:nvGrpSpPr>
+      <p:grpSpPr>
+        <a:xfrm>
+          <a:off x="0" y="0"/>
+          <a:ext cx="0" cy="0"/>
+          <a:chOff x="0" y="0"/>
+          <a:chExt cx="0" cy="0"/>
+        </a:xfrm>
+      </p:grpSpPr>
+      <p:sp>
+        <p:nvSpPr>
+          <p:cNvPr id="2" name="Slide Image Placeholder 1"/>
+          <p:cNvSpPr>
+            <a:spLocks noGrp="1" noRot="1" noChangeAspect="1"/>
+          </p:cNvSpPr>
+          <p:nvPr>
+            <p:ph type="sldImg"/>
+          </p:nvPr>
+        </p:nvSpPr>
+        <p:spPr/>
+      </p:sp>
+      <p:sp>
+        <p:nvSpPr>
+          <p:cNvPr id="3" name="Notes Placeholder 2"/>
+          <p:cNvSpPr>
+            <a:spLocks noGrp="1"/>
+          </p:cNvSpPr>
+          <p:nvPr>
+            <p:ph type="body" idx="1"/>
+          </p:nvPr>
+        </p:nvSpPr>
+        <p:spPr/>
+        <p:txBody>
+          <a:bodyPr/>
+          <a:lstStyle/>
+          <a:p>
+            <a:r>
+              <a:rPr lang="en-US" dirty="0" smtClean="0"/>
+              <a:t>Many organizations start with the channel</a:t>
+            </a:r>
+            <a:r>
+              <a:rPr lang="en-US" baseline="0" dirty="0" smtClean="0"/>
+              <a:t> – the medium through which they communicate.  Everybody’s doing social media, we need to be doing something too!  </a:t>
+            </a:r>
+            <a:endParaRPr lang="en-US" dirty="0"/>
+          </a:p>
+        </p:txBody>
+      </p:sp>
+      <p:sp>
+        <p:nvSpPr>
+          <p:cNvPr id="4" name="Slide Number Placeholder 3"/>
+          <p:cNvSpPr>
+            <a:spLocks noGrp="1"/>
+          </p:cNvSpPr>
+          <p:nvPr>
+            <p:ph type="sldNum" sz="quarter" idx="10"/>
+          </p:nvPr>
+        </p:nvSpPr>
+        <p:spPr/>
+        <p:txBody>
+          <a:bodyPr/>
+          <a:lstStyle/>
+          <a:p>
+            <a:fld id="{69771C7D-C45A-4918-80C1-CE7F4A88DA47}" type="slidenum">
+              <a:rPr lang="en-US" smtClean="0"/>
+              <a:t>8</a:t>
+            </a:fld>
+            <a:endParaRPr lang="en-US"/>
+          </a:p>
+        </p:txBody>
+      </p:sp>
+    </p:spTree>
+    <p:extLst>
+      <p:ext uri="{BB962C8B-B14F-4D97-AF65-F5344CB8AC3E}">
+        <p14:creationId xmlns:p14="http://schemas.microsoft.com/office/powerpoint/2010/main" val="2524366179"/>
+      </p:ext>
+    </p:extLst>
+  </p:cSld>
+  <p:clrMapOvr>
+    <a:masterClrMapping/>
+  </p:clrMapOvr>
+</p:notes>
+</file>
+
+<file path=ppt/notesSlides/notesSlide9.xml><?xml version="1.0" encoding="utf-8"?>
+<p:notes xmlns:a="http://schemas.openxmlformats.org/drawingml/2006/main" xmlns:r="http://schemas.openxmlformats.org/officeDocument/2006/relationships" xmlns:p="http://schemas.openxmlformats.org/presentationml/2006/main">
+  <p:cSld>
+    <p:spTree>
+      <p:nvGrpSpPr>
+        <p:cNvPr id="1" name=""/>
+        <p:cNvGrpSpPr/>
+        <p:nvPr/>
+      </p:nvGrpSpPr>
+      <p:grpSpPr>
+        <a:xfrm>
+          <a:off x="0" y="0"/>
+          <a:ext cx="0" cy="0"/>
+          <a:chOff x="0" y="0"/>
+          <a:chExt cx="0" cy="0"/>
+        </a:xfrm>
+      </p:grpSpPr>
+      <p:sp>
+        <p:nvSpPr>
+          <p:cNvPr id="2" name="Slide Image Placeholder 1"/>
+          <p:cNvSpPr>
+            <a:spLocks noGrp="1" noRot="1" noChangeAspect="1"/>
+          </p:cNvSpPr>
+          <p:nvPr>
+            <p:ph type="sldImg"/>
+          </p:nvPr>
+        </p:nvSpPr>
+        <p:spPr/>
+      </p:sp>
+      <p:sp>
+        <p:nvSpPr>
+          <p:cNvPr id="3" name="Notes Placeholder 2"/>
+          <p:cNvSpPr>
+            <a:spLocks noGrp="1"/>
+          </p:cNvSpPr>
+          <p:nvPr>
+            <p:ph type="body" idx="1"/>
+          </p:nvPr>
+        </p:nvSpPr>
+        <p:spPr/>
+        <p:txBody>
+          <a:bodyPr/>
+          <a:lstStyle/>
+          <a:p>
+            <a:r>
+              <a:rPr lang="en-US" dirty="0" smtClean="0"/>
               <a:t>If you flip the order</a:t>
             </a:r>
             <a:r>
@@ -1153,7 +1405,11 @@
             </a:r>
             <a:r>
               <a:rPr lang="en-US" baseline="0" dirty="0" smtClean="0"/>
-              <a:t> chances of developing clear, high-impact messages drops dramatically.  You become nothing more than noise in the social media landscape.  </a:t>
+              <a:t> chances of developing clear, high-impact messages drops dramatically.  You become nothing more than noise in </a:t>
+            </a:r>
+            <a:r>
+              <a:rPr lang="en-US" baseline="0" dirty="0" smtClean="0"/>
+              <a:t>the competitive landscape.  </a:t>
             </a:r>
             <a:endParaRPr lang="en-US" dirty="0"/>
           </a:p>
@@ -1326,7 +1582,7 @@
           <a:p>
             <a:fld id="{EBFC9365-5129-4E0D-8D84-174D535751F3}" type="datetimeFigureOut">
               <a:rPr lang="en-US" smtClean="0"/>
-              <a:t>11/12/2018</a:t>
+              <a:t>12/11/2018</a:t>
             </a:fld>
             <a:endParaRPr lang="en-US"/>
           </a:p>
@@ -1496,7 +1752,7 @@
           <a:p>
             <a:fld id="{EBFC9365-5129-4E0D-8D84-174D535751F3}" type="datetimeFigureOut">
               <a:rPr lang="en-US" smtClean="0"/>
-              <a:t>11/12/2018</a:t>
+              <a:t>12/11/2018</a:t>
             </a:fld>
             <a:endParaRPr lang="en-US"/>
           </a:p>
@@ -1676,7 +1932,7 @@
           <a:p>
             <a:fld id="{EBFC9365-5129-4E0D-8D84-174D535751F3}" type="datetimeFigureOut">
               <a:rPr lang="en-US" smtClean="0"/>
-              <a:t>11/12/2018</a:t>
+              <a:t>12/11/2018</a:t>
             </a:fld>
             <a:endParaRPr lang="en-US"/>
           </a:p>
@@ -1846,7 +2102,7 @@
           <a:p>
             <a:fld id="{EBFC9365-5129-4E0D-8D84-174D535751F3}" type="datetimeFigureOut">
               <a:rPr lang="en-US" smtClean="0"/>
-              <a:t>11/12/2018</a:t>
+              <a:t>12/11/2018</a:t>
             </a:fld>
             <a:endParaRPr lang="en-US"/>
           </a:p>
@@ -2092,7 +2348,7 @@
           <a:p>
             <a:fld id="{EBFC9365-5129-4E0D-8D84-174D535751F3}" type="datetimeFigureOut">
               <a:rPr lang="en-US" smtClean="0"/>
-              <a:t>11/12/2018</a:t>
+              <a:t>12/11/2018</a:t>
             </a:fld>
             <a:endParaRPr lang="en-US"/>
           </a:p>
@@ -2324,7 +2580,7 @@
           <a:p>
             <a:fld id="{EBFC9365-5129-4E0D-8D84-174D535751F3}" type="datetimeFigureOut">
               <a:rPr lang="en-US" smtClean="0"/>
-              <a:t>11/12/2018</a:t>
+              <a:t>12/11/2018</a:t>
             </a:fld>
             <a:endParaRPr lang="en-US"/>
           </a:p>
@@ -2691,7 +2947,7 @@
           <a:p>
             <a:fld id="{EBFC9365-5129-4E0D-8D84-174D535751F3}" type="datetimeFigureOut">
               <a:rPr lang="en-US" smtClean="0"/>
-              <a:t>11/12/2018</a:t>
+              <a:t>12/11/2018</a:t>
             </a:fld>
             <a:endParaRPr lang="en-US"/>
           </a:p>
@@ -2809,7 +3065,7 @@
           <a:p>
             <a:fld id="{EBFC9365-5129-4E0D-8D84-174D535751F3}" type="datetimeFigureOut">
               <a:rPr lang="en-US" smtClean="0"/>
-              <a:t>11/12/2018</a:t>
+              <a:t>12/11/2018</a:t>
             </a:fld>
             <a:endParaRPr lang="en-US"/>
           </a:p>
@@ -2904,7 +3160,7 @@
           <a:p>
             <a:fld id="{EBFC9365-5129-4E0D-8D84-174D535751F3}" type="datetimeFigureOut">
               <a:rPr lang="en-US" smtClean="0"/>
-              <a:t>11/12/2018</a:t>
+              <a:t>12/11/2018</a:t>
             </a:fld>
             <a:endParaRPr lang="en-US"/>
           </a:p>
@@ -3181,7 +3437,7 @@
           <a:p>
             <a:fld id="{EBFC9365-5129-4E0D-8D84-174D535751F3}" type="datetimeFigureOut">
               <a:rPr lang="en-US" smtClean="0"/>
-              <a:t>11/12/2018</a:t>
+              <a:t>12/11/2018</a:t>
             </a:fld>
             <a:endParaRPr lang="en-US"/>
           </a:p>
@@ -3434,7 +3690,7 @@
           <a:p>
             <a:fld id="{EBFC9365-5129-4E0D-8D84-174D535751F3}" type="datetimeFigureOut">
               <a:rPr lang="en-US" smtClean="0"/>
-              <a:t>11/12/2018</a:t>
+              <a:t>12/11/2018</a:t>
             </a:fld>
             <a:endParaRPr lang="en-US"/>
           </a:p>
@@ -3647,7 +3903,7 @@
           <a:p>
             <a:fld id="{EBFC9365-5129-4E0D-8D84-174D535751F3}" type="datetimeFigureOut">
               <a:rPr lang="en-US" smtClean="0"/>
-              <a:t>11/12/2018</a:t>
+              <a:t>12/11/2018</a:t>
             </a:fld>
             <a:endParaRPr lang="en-US"/>
           </a:p>
@@ -4096,7 +4352,12 @@
             <p:ph type="ctrTitle"/>
           </p:nvPr>
         </p:nvSpPr>
-        <p:spPr/>
+        <p:spPr>
+          <a:xfrm>
+            <a:off x="94343" y="972457"/>
+            <a:ext cx="12003314" cy="1594077"/>
+          </a:xfrm>
+        </p:spPr>
         <p:txBody>
           <a:bodyPr>
             <a:normAutofit/>
@@ -4105,7 +4366,7 @@
           <a:p>
             <a:r>
               <a:rPr lang="en-US" sz="7200" dirty="0" smtClean="0"/>
-              <a:t>Branding</a:t>
+              <a:t>The Unique Value Proposition</a:t>
             </a:r>
             <a:endParaRPr lang="en-US" sz="7200" dirty="0"/>
           </a:p>
@@ -4113,14 +4374,14 @@
       </p:sp>
       <p:pic>
         <p:nvPicPr>
-          <p:cNvPr id="5" name="Picture 4"/>
+          <p:cNvPr id="4" name="Picture 3"/>
           <p:cNvPicPr>
             <a:picLocks noChangeAspect="1"/>
           </p:cNvPicPr>
           <p:nvPr/>
         </p:nvPicPr>
         <p:blipFill>
-          <a:blip r:embed="rId2" cstate="print">
+          <a:blip r:embed="rId3">
             <a:extLst>
               <a:ext uri="{28A0092B-C50C-407E-A947-70E740481C1C}">
                 <a14:useLocalDpi xmlns:a14="http://schemas.microsoft.com/office/drawing/2010/main" val="0"/>
@@ -4133,8 +4394,8 @@
         </p:blipFill>
         <p:spPr>
           <a:xfrm>
-            <a:off x="4913158" y="4419601"/>
-            <a:ext cx="2365684" cy="851646"/>
+            <a:off x="2781300" y="3213553"/>
+            <a:ext cx="6629400" cy="2724150"/>
           </a:xfrm>
           <a:prstGeom prst="rect">
             <a:avLst/>
@@ -4321,15 +4582,62 @@
           <a:chExt cx="0" cy="0"/>
         </a:xfrm>
       </p:grpSpPr>
+      <p:sp>
+        <p:nvSpPr>
+          <p:cNvPr id="6" name="Title 1"/>
+          <p:cNvSpPr txBox="1">
+            <a:spLocks/>
+          </p:cNvSpPr>
+          <p:nvPr/>
+        </p:nvSpPr>
+        <p:spPr>
+          <a:xfrm>
+            <a:off x="94343" y="972457"/>
+            <a:ext cx="12003314" cy="1594077"/>
+          </a:xfrm>
+          <a:prstGeom prst="rect">
+            <a:avLst/>
+          </a:prstGeom>
+        </p:spPr>
+        <p:txBody>
+          <a:bodyPr vert="horz" lIns="91440" tIns="45720" rIns="91440" bIns="45720" rtlCol="0" anchor="ctr">
+            <a:normAutofit/>
+          </a:bodyPr>
+          <a:lstStyle>
+            <a:lvl1pPr algn="l" defTabSz="914400" rtl="0" eaLnBrk="1" latinLnBrk="0" hangingPunct="1">
+              <a:lnSpc>
+                <a:spcPct val="90000"/>
+              </a:lnSpc>
+              <a:spcBef>
+                <a:spcPct val="0"/>
+              </a:spcBef>
+              <a:buNone/>
+              <a:defRPr sz="4400" kern="1200">
+                <a:solidFill>
+                  <a:schemeClr val="tx1"/>
+                </a:solidFill>
+                <a:latin typeface="+mj-lt"/>
+                <a:ea typeface="+mj-ea"/>
+                <a:cs typeface="+mj-cs"/>
+              </a:defRPr>
+            </a:lvl1pPr>
+          </a:lstStyle>
+          <a:p>
+            <a:r>
+              <a:rPr lang="en-US" sz="7200" smtClean="0"/>
+              <a:t>The Unique Value Proposition</a:t>
+            </a:r>
+            <a:endParaRPr lang="en-US" sz="7200" dirty="0"/>
+          </a:p>
+        </p:txBody>
+      </p:sp>
       <p:pic>
         <p:nvPicPr>
-          <p:cNvPr id="4" name="Content Placeholder 3"/>
+          <p:cNvPr id="7" name="Picture 6"/>
           <p:cNvPicPr>
-            <a:picLocks noGrp="1" noChangeAspect="1"/>
+            <a:picLocks noChangeAspect="1"/>
           </p:cNvPicPr>
-          <p:nvPr>
-            <p:ph idx="1"/>
-          </p:nvPr>
+          <p:nvPr/>
         </p:nvPicPr>
         <p:blipFill>
           <a:blip r:embed="rId3">
@@ -4345,15 +4653,18 @@
         </p:blipFill>
         <p:spPr>
           <a:xfrm>
-            <a:off x="4766182" y="1377400"/>
-            <a:ext cx="2659635" cy="4351338"/>
+            <a:off x="695470" y="3367894"/>
+            <a:ext cx="10058400" cy="1342874"/>
           </a:xfrm>
+          <a:prstGeom prst="rect">
+            <a:avLst/>
+          </a:prstGeom>
         </p:spPr>
       </p:pic>
     </p:spTree>
     <p:extLst>
       <p:ext uri="{BB962C8B-B14F-4D97-AF65-F5344CB8AC3E}">
-        <p14:creationId xmlns:p14="http://schemas.microsoft.com/office/powerpoint/2010/main" val="2681395144"/>
+        <p14:creationId xmlns:p14="http://schemas.microsoft.com/office/powerpoint/2010/main" val="3763411594"/>
       </p:ext>
     </p:extLst>
   </p:cSld>
@@ -4414,62 +4725,69 @@
           <a:chExt cx="0" cy="0"/>
         </a:xfrm>
       </p:grpSpPr>
-      <p:sp>
-        <p:nvSpPr>
-          <p:cNvPr id="3" name="Content Placeholder 2"/>
-          <p:cNvSpPr>
-            <a:spLocks noGrp="1"/>
-          </p:cNvSpPr>
+      <p:pic>
+        <p:nvPicPr>
+          <p:cNvPr id="4" name="Content Placeholder 3"/>
+          <p:cNvPicPr>
+            <a:picLocks noGrp="1" noChangeAspect="1"/>
+          </p:cNvPicPr>
           <p:nvPr>
             <p:ph idx="1"/>
           </p:nvPr>
-        </p:nvSpPr>
+        </p:nvPicPr>
+        <p:blipFill>
+          <a:blip r:embed="rId3">
+            <a:extLst>
+              <a:ext uri="{28A0092B-C50C-407E-A947-70E740481C1C}">
+                <a14:useLocalDpi xmlns:a14="http://schemas.microsoft.com/office/drawing/2010/main" val="0"/>
+              </a:ext>
+            </a:extLst>
+          </a:blip>
+          <a:stretch>
+            <a:fillRect/>
+          </a:stretch>
+        </p:blipFill>
         <p:spPr>
           <a:xfrm>
-            <a:off x="838201" y="821578"/>
-            <a:ext cx="10515600" cy="4987552"/>
+            <a:off x="2951897" y="1391914"/>
+            <a:ext cx="2659635" cy="4351338"/>
           </a:xfrm>
         </p:spPr>
-        <p:txBody>
-          <a:bodyPr>
-            <a:normAutofit/>
-          </a:bodyPr>
-          <a:lstStyle/>
-          <a:p>
-            <a:pPr marL="0" indent="0">
-              <a:buNone/>
-            </a:pPr>
-            <a:endParaRPr lang="en-US" dirty="0" smtClean="0"/>
-          </a:p>
-          <a:p>
-            <a:pPr marL="0" indent="0">
-              <a:buNone/>
-            </a:pPr>
-            <a:endParaRPr lang="en-US" dirty="0"/>
-          </a:p>
-          <a:p>
-            <a:pPr marL="0" indent="0" algn="ctr">
-              <a:buNone/>
-            </a:pPr>
-            <a:endParaRPr lang="en-US" sz="7200" dirty="0" smtClean="0"/>
-          </a:p>
-          <a:p>
-            <a:pPr marL="0" indent="0" algn="ctr">
-              <a:buNone/>
-            </a:pPr>
-            <a:r>
-              <a:rPr lang="en-US" sz="7200" dirty="0" smtClean="0">
-                <a:latin typeface="+mj-lt"/>
-              </a:rPr>
-              <a:t>Unique Value Proposition</a:t>
-            </a:r>
-          </a:p>
-        </p:txBody>
-      </p:sp>
+      </p:pic>
+      <p:pic>
+        <p:nvPicPr>
+          <p:cNvPr id="2" name="Picture 1"/>
+          <p:cNvPicPr>
+            <a:picLocks noChangeAspect="1"/>
+          </p:cNvPicPr>
+          <p:nvPr/>
+        </p:nvPicPr>
+        <p:blipFill>
+          <a:blip r:embed="rId4">
+            <a:extLst>
+              <a:ext uri="{28A0092B-C50C-407E-A947-70E740481C1C}">
+                <a14:useLocalDpi xmlns:a14="http://schemas.microsoft.com/office/drawing/2010/main" val="0"/>
+              </a:ext>
+            </a:extLst>
+          </a:blip>
+          <a:stretch>
+            <a:fillRect/>
+          </a:stretch>
+        </p:blipFill>
+        <p:spPr>
+          <a:xfrm>
+            <a:off x="6407605" y="1391914"/>
+            <a:ext cx="2779939" cy="4370990"/>
+          </a:xfrm>
+          <a:prstGeom prst="rect">
+            <a:avLst/>
+          </a:prstGeom>
+        </p:spPr>
+      </p:pic>
     </p:spTree>
     <p:extLst>
       <p:ext uri="{BB962C8B-B14F-4D97-AF65-F5344CB8AC3E}">
-        <p14:creationId xmlns:p14="http://schemas.microsoft.com/office/powerpoint/2010/main" val="3763411594"/>
+        <p14:creationId xmlns:p14="http://schemas.microsoft.com/office/powerpoint/2010/main" val="2681395144"/>
       </p:ext>
     </p:extLst>
   </p:cSld>
@@ -4767,6 +5085,65 @@
           <a:chExt cx="0" cy="0"/>
         </a:xfrm>
       </p:grpSpPr>
+      <p:sp>
+        <p:nvSpPr>
+          <p:cNvPr id="4" name="Content Placeholder 2"/>
+          <p:cNvSpPr>
+            <a:spLocks noGrp="1"/>
+          </p:cNvSpPr>
+          <p:nvPr>
+            <p:ph idx="1"/>
+          </p:nvPr>
+        </p:nvSpPr>
+        <p:spPr>
+          <a:xfrm>
+            <a:off x="874060" y="699247"/>
+            <a:ext cx="10515600" cy="4987552"/>
+          </a:xfrm>
+        </p:spPr>
+        <p:txBody>
+          <a:bodyPr>
+            <a:normAutofit/>
+          </a:bodyPr>
+          <a:lstStyle/>
+          <a:p>
+            <a:pPr marL="0" indent="0" algn="ctr">
+              <a:buNone/>
+            </a:pPr>
+            <a:endParaRPr lang="en-US" sz="7200" dirty="0" smtClean="0"/>
+          </a:p>
+          <a:p>
+            <a:pPr marL="0" indent="0" algn="ctr">
+              <a:buNone/>
+            </a:pPr>
+            <a:r>
+              <a:rPr lang="en-US" sz="7200" dirty="0" smtClean="0">
+                <a:latin typeface="+mj-lt"/>
+              </a:rPr>
+              <a:t>Define your Market</a:t>
+            </a:r>
+            <a:endParaRPr lang="en-US" sz="7200" dirty="0" smtClean="0">
+              <a:latin typeface="+mj-lt"/>
+            </a:endParaRPr>
+          </a:p>
+          <a:p>
+            <a:pPr marL="0" indent="0" algn="ctr">
+              <a:buNone/>
+            </a:pPr>
+            <a:endParaRPr lang="en-US" sz="7200" dirty="0" smtClean="0">
+              <a:latin typeface="+mj-lt"/>
+            </a:endParaRPr>
+          </a:p>
+          <a:p>
+            <a:pPr marL="0" indent="0" algn="ctr">
+              <a:buNone/>
+            </a:pPr>
+            <a:endParaRPr lang="en-US" sz="2400" dirty="0" smtClean="0">
+              <a:latin typeface="+mj-lt"/>
+            </a:endParaRPr>
+          </a:p>
+        </p:txBody>
+      </p:sp>
       <p:pic>
         <p:nvPicPr>
           <p:cNvPr id="2" name="Picture 1"/>
@@ -4776,7 +5153,7 @@
           <p:nvPr/>
         </p:nvPicPr>
         <p:blipFill>
-          <a:blip r:embed="rId3">
+          <a:blip r:embed="rId3" cstate="print">
             <a:extLst>
               <a:ext uri="{28A0092B-C50C-407E-A947-70E740481C1C}">
                 <a14:useLocalDpi xmlns:a14="http://schemas.microsoft.com/office/drawing/2010/main" val="0"/>
@@ -4789,8 +5166,8 @@
         </p:blipFill>
         <p:spPr>
           <a:xfrm>
-            <a:off x="3627343" y="2288240"/>
-            <a:ext cx="4942595" cy="2767853"/>
+            <a:off x="4607860" y="3907464"/>
+            <a:ext cx="3048000" cy="2033016"/>
           </a:xfrm>
           <a:prstGeom prst="rect">
             <a:avLst/>
@@ -4800,7 +5177,7 @@
     </p:spTree>
     <p:extLst>
       <p:ext uri="{BB962C8B-B14F-4D97-AF65-F5344CB8AC3E}">
-        <p14:creationId xmlns:p14="http://schemas.microsoft.com/office/powerpoint/2010/main" val="1308324337"/>
+        <p14:creationId xmlns:p14="http://schemas.microsoft.com/office/powerpoint/2010/main" val="1864868703"/>
       </p:ext>
     </p:extLst>
   </p:cSld>
@@ -4863,7 +5240,7 @@
       </p:grpSpPr>
       <p:sp>
         <p:nvSpPr>
-          <p:cNvPr id="4" name="Content Placeholder 2"/>
+          <p:cNvPr id="3" name="Content Placeholder 2"/>
           <p:cNvSpPr>
             <a:spLocks noGrp="1"/>
           </p:cNvSpPr>
@@ -4883,18 +5260,6 @@
           </a:bodyPr>
           <a:lstStyle/>
           <a:p>
-            <a:pPr marL="0" indent="0">
-              <a:buNone/>
-            </a:pPr>
-            <a:endParaRPr lang="en-US" dirty="0" smtClean="0"/>
-          </a:p>
-          <a:p>
-            <a:pPr marL="0" indent="0">
-              <a:buNone/>
-            </a:pPr>
-            <a:endParaRPr lang="en-US" dirty="0"/>
-          </a:p>
-          <a:p>
             <a:pPr marL="0" indent="0" algn="ctr">
               <a:buNone/>
             </a:pPr>
@@ -4908,8 +5273,11 @@
               <a:rPr lang="en-US" sz="7200" dirty="0" smtClean="0">
                 <a:latin typeface="+mj-lt"/>
               </a:rPr>
-              <a:t>Start with the Client</a:t>
-            </a:r>
+              <a:t>Identify your Expertise</a:t>
+            </a:r>
+            <a:endParaRPr lang="en-US" sz="7200" dirty="0" smtClean="0">
+              <a:latin typeface="+mj-lt"/>
+            </a:endParaRPr>
           </a:p>
           <a:p>
             <a:pPr marL="0" indent="0" algn="ctr">
@@ -4929,10 +5297,40 @@
           </a:p>
         </p:txBody>
       </p:sp>
+      <p:pic>
+        <p:nvPicPr>
+          <p:cNvPr id="4" name="Picture 3"/>
+          <p:cNvPicPr>
+            <a:picLocks noChangeAspect="1"/>
+          </p:cNvPicPr>
+          <p:nvPr/>
+        </p:nvPicPr>
+        <p:blipFill>
+          <a:blip r:embed="rId3">
+            <a:extLst>
+              <a:ext uri="{28A0092B-C50C-407E-A947-70E740481C1C}">
+                <a14:useLocalDpi xmlns:a14="http://schemas.microsoft.com/office/drawing/2010/main" val="0"/>
+              </a:ext>
+            </a:extLst>
+          </a:blip>
+          <a:stretch>
+            <a:fillRect/>
+          </a:stretch>
+        </p:blipFill>
+        <p:spPr>
+          <a:xfrm>
+            <a:off x="4703110" y="3934199"/>
+            <a:ext cx="2857500" cy="1752600"/>
+          </a:xfrm>
+          <a:prstGeom prst="rect">
+            <a:avLst/>
+          </a:prstGeom>
+        </p:spPr>
+      </p:pic>
     </p:spTree>
     <p:extLst>
       <p:ext uri="{BB962C8B-B14F-4D97-AF65-F5344CB8AC3E}">
-        <p14:creationId xmlns:p14="http://schemas.microsoft.com/office/powerpoint/2010/main" val="1864868703"/>
+        <p14:creationId xmlns:p14="http://schemas.microsoft.com/office/powerpoint/2010/main" val="1308324337"/>
       </p:ext>
     </p:extLst>
   </p:cSld>
@@ -5015,18 +5413,6 @@
           </a:bodyPr>
           <a:lstStyle/>
           <a:p>
-            <a:pPr marL="0" indent="0">
-              <a:buNone/>
-            </a:pPr>
-            <a:endParaRPr lang="en-US" dirty="0" smtClean="0"/>
-          </a:p>
-          <a:p>
-            <a:pPr marL="0" indent="0">
-              <a:buNone/>
-            </a:pPr>
-            <a:endParaRPr lang="en-US" dirty="0"/>
-          </a:p>
-          <a:p>
             <a:pPr marL="0" indent="0" algn="ctr">
               <a:buNone/>
             </a:pPr>
@@ -5040,8 +5426,11 @@
               <a:rPr lang="en-US" sz="7200" dirty="0" smtClean="0">
                 <a:latin typeface="+mj-lt"/>
               </a:rPr>
-              <a:t>Alignment</a:t>
-            </a:r>
+              <a:t>Check Alignment</a:t>
+            </a:r>
+            <a:endParaRPr lang="en-US" sz="7200" dirty="0" smtClean="0">
+              <a:latin typeface="+mj-lt"/>
+            </a:endParaRPr>
           </a:p>
           <a:p>
             <a:pPr marL="0" indent="0" algn="ctr">
@@ -5061,6 +5450,36 @@
           </a:p>
         </p:txBody>
       </p:sp>
+      <p:pic>
+        <p:nvPicPr>
+          <p:cNvPr id="2" name="Picture 1"/>
+          <p:cNvPicPr>
+            <a:picLocks noChangeAspect="1"/>
+          </p:cNvPicPr>
+          <p:nvPr/>
+        </p:nvPicPr>
+        <p:blipFill>
+          <a:blip r:embed="rId3">
+            <a:extLst>
+              <a:ext uri="{28A0092B-C50C-407E-A947-70E740481C1C}">
+                <a14:useLocalDpi xmlns:a14="http://schemas.microsoft.com/office/drawing/2010/main" val="0"/>
+              </a:ext>
+            </a:extLst>
+          </a:blip>
+          <a:stretch>
+            <a:fillRect/>
+          </a:stretch>
+        </p:blipFill>
+        <p:spPr>
+          <a:xfrm>
+            <a:off x="4689003" y="3962989"/>
+            <a:ext cx="2885714" cy="1723810"/>
+          </a:xfrm>
+          <a:prstGeom prst="rect">
+            <a:avLst/>
+          </a:prstGeom>
+        </p:spPr>
+      </p:pic>
     </p:spTree>
     <p:extLst>
       <p:ext uri="{BB962C8B-B14F-4D97-AF65-F5344CB8AC3E}">
@@ -5177,7 +5596,19 @@
               <a:rPr lang="en-US" sz="7200" dirty="0" smtClean="0">
                 <a:latin typeface="+mj-lt"/>
               </a:rPr>
-              <a:t>Channels (Second)</a:t>
+              <a:t>Everything Else</a:t>
+            </a:r>
+            <a:r>
+              <a:rPr lang="en-US" sz="7200" dirty="0" smtClean="0">
+                <a:latin typeface="+mj-lt"/>
+              </a:rPr>
+              <a:t> </a:t>
+            </a:r>
+            <a:r>
+              <a:rPr lang="en-US" sz="7200" dirty="0" smtClean="0">
+                <a:latin typeface="+mj-lt"/>
+              </a:rPr>
+              <a:t>(Second)</a:t>
             </a:r>
           </a:p>
           <a:p>
@@ -5334,14 +5765,14 @@
       </p:sp>
       <p:pic>
         <p:nvPicPr>
-          <p:cNvPr id="6" name="Picture 5"/>
+          <p:cNvPr id="7" name="Picture 6"/>
           <p:cNvPicPr>
             <a:picLocks noChangeAspect="1"/>
           </p:cNvPicPr>
           <p:nvPr/>
         </p:nvPicPr>
         <p:blipFill>
-          <a:blip r:embed="rId3">
+          <a:blip r:embed="rId3" cstate="print">
             <a:extLst>
               <a:ext uri="{28A0092B-C50C-407E-A947-70E740481C1C}">
                 <a14:useLocalDpi xmlns:a14="http://schemas.microsoft.com/office/drawing/2010/main" val="0"/>
@@ -5354,8 +5785,8 @@
         </p:blipFill>
         <p:spPr>
           <a:xfrm>
-            <a:off x="4191001" y="3239701"/>
-            <a:ext cx="3810000" cy="2571750"/>
+            <a:off x="4644571" y="3652078"/>
+            <a:ext cx="2902859" cy="2177144"/>
           </a:xfrm>
           <a:prstGeom prst="rect">
             <a:avLst/>

</xml_diff>

<commit_message>
Edited the Alignment slide comments.
</commit_message>
<xml_diff>
--- a/_library/library_as_brand.pptx
+++ b/_library/library_as_brand.pptx
@@ -20,7 +20,7 @@
     <p:sldId id="265" r:id="rId11"/>
   </p:sldIdLst>
   <p:sldSz cx="12192000" cy="6858000"/>
-  <p:notesSz cx="6858000" cy="9144000"/>
+  <p:notesSz cx="7023100" cy="9309100"/>
   <p:defaultTextStyle>
     <a:defPPr>
       <a:defRPr lang="en-US"/>
@@ -162,14 +162,14 @@
         <p:spPr>
           <a:xfrm>
             <a:off x="0" y="0"/>
-            <a:ext cx="2971800" cy="458788"/>
+            <a:ext cx="3043343" cy="467072"/>
           </a:xfrm>
           <a:prstGeom prst="rect">
             <a:avLst/>
           </a:prstGeom>
         </p:spPr>
         <p:txBody>
-          <a:bodyPr vert="horz" lIns="91440" tIns="45720" rIns="91440" bIns="45720" rtlCol="0"/>
+          <a:bodyPr vert="horz" lIns="93324" tIns="46662" rIns="93324" bIns="46662" rtlCol="0"/>
           <a:lstStyle>
             <a:lvl1pPr algn="l">
               <a:defRPr sz="1200"/>
@@ -192,15 +192,15 @@
         </p:nvSpPr>
         <p:spPr>
           <a:xfrm>
-            <a:off x="3884613" y="0"/>
-            <a:ext cx="2971800" cy="458788"/>
+            <a:off x="3978132" y="0"/>
+            <a:ext cx="3043343" cy="467072"/>
           </a:xfrm>
           <a:prstGeom prst="rect">
             <a:avLst/>
           </a:prstGeom>
         </p:spPr>
         <p:txBody>
-          <a:bodyPr vert="horz" lIns="91440" tIns="45720" rIns="91440" bIns="45720" rtlCol="0"/>
+          <a:bodyPr vert="horz" lIns="93324" tIns="46662" rIns="93324" bIns="46662" rtlCol="0"/>
           <a:lstStyle>
             <a:lvl1pPr algn="r">
               <a:defRPr sz="1200"/>
@@ -227,8 +227,8 @@
         </p:nvSpPr>
         <p:spPr>
           <a:xfrm>
-            <a:off x="685800" y="1143000"/>
-            <a:ext cx="5486400" cy="3086100"/>
+            <a:off x="719138" y="1163638"/>
+            <a:ext cx="5584825" cy="3141662"/>
           </a:xfrm>
           <a:prstGeom prst="rect">
             <a:avLst/>
@@ -241,7 +241,7 @@
           </a:ln>
         </p:spPr>
         <p:txBody>
-          <a:bodyPr vert="horz" lIns="91440" tIns="45720" rIns="91440" bIns="45720" rtlCol="0" anchor="ctr"/>
+          <a:bodyPr vert="horz" lIns="93324" tIns="46662" rIns="93324" bIns="46662" rtlCol="0" anchor="ctr"/>
           <a:lstStyle/>
           <a:p>
             <a:endParaRPr lang="en-US"/>
@@ -260,15 +260,15 @@
         </p:nvSpPr>
         <p:spPr>
           <a:xfrm>
-            <a:off x="685800" y="4400550"/>
-            <a:ext cx="5486400" cy="3600450"/>
+            <a:off x="702310" y="4480004"/>
+            <a:ext cx="5618480" cy="3665458"/>
           </a:xfrm>
           <a:prstGeom prst="rect">
             <a:avLst/>
           </a:prstGeom>
         </p:spPr>
         <p:txBody>
-          <a:bodyPr vert="horz" lIns="91440" tIns="45720" rIns="91440" bIns="45720" rtlCol="0"/>
+          <a:bodyPr vert="horz" lIns="93324" tIns="46662" rIns="93324" bIns="46662" rtlCol="0"/>
           <a:lstStyle/>
           <a:p>
             <a:pPr lvl="0"/>
@@ -320,15 +320,15 @@
         </p:nvSpPr>
         <p:spPr>
           <a:xfrm>
-            <a:off x="0" y="8685213"/>
-            <a:ext cx="2971800" cy="458787"/>
+            <a:off x="0" y="8842030"/>
+            <a:ext cx="3043343" cy="467071"/>
           </a:xfrm>
           <a:prstGeom prst="rect">
             <a:avLst/>
           </a:prstGeom>
         </p:spPr>
         <p:txBody>
-          <a:bodyPr vert="horz" lIns="91440" tIns="45720" rIns="91440" bIns="45720" rtlCol="0" anchor="b"/>
+          <a:bodyPr vert="horz" lIns="93324" tIns="46662" rIns="93324" bIns="46662" rtlCol="0" anchor="b"/>
           <a:lstStyle>
             <a:lvl1pPr algn="l">
               <a:defRPr sz="1200"/>
@@ -351,15 +351,15 @@
         </p:nvSpPr>
         <p:spPr>
           <a:xfrm>
-            <a:off x="3884613" y="8685213"/>
-            <a:ext cx="2971800" cy="458787"/>
+            <a:off x="3978132" y="8842030"/>
+            <a:ext cx="3043343" cy="467071"/>
           </a:xfrm>
           <a:prstGeom prst="rect">
             <a:avLst/>
           </a:prstGeom>
         </p:spPr>
         <p:txBody>
-          <a:bodyPr vert="horz" lIns="91440" tIns="45720" rIns="91440" bIns="45720" rtlCol="0" anchor="b"/>
+          <a:bodyPr vert="horz" lIns="93324" tIns="46662" rIns="93324" bIns="46662" rtlCol="0" anchor="b"/>
           <a:lstStyle>
             <a:lvl1pPr algn="r">
               <a:defRPr sz="1200"/>
@@ -569,6 +569,90 @@
 </p:notes>
 </file>
 
+<file path=ppt/notesSlides/notesSlide10.xml><?xml version="1.0" encoding="utf-8"?>
+<p:notes xmlns:a="http://schemas.openxmlformats.org/drawingml/2006/main" xmlns:r="http://schemas.openxmlformats.org/officeDocument/2006/relationships" xmlns:p="http://schemas.openxmlformats.org/presentationml/2006/main">
+  <p:cSld>
+    <p:spTree>
+      <p:nvGrpSpPr>
+        <p:cNvPr id="1" name=""/>
+        <p:cNvGrpSpPr/>
+        <p:nvPr/>
+      </p:nvGrpSpPr>
+      <p:grpSpPr>
+        <a:xfrm>
+          <a:off x="0" y="0"/>
+          <a:ext cx="0" cy="0"/>
+          <a:chOff x="0" y="0"/>
+          <a:chExt cx="0" cy="0"/>
+        </a:xfrm>
+      </p:grpSpPr>
+      <p:sp>
+        <p:nvSpPr>
+          <p:cNvPr id="2" name="Slide Image Placeholder 1"/>
+          <p:cNvSpPr>
+            <a:spLocks noGrp="1" noRot="1" noChangeAspect="1"/>
+          </p:cNvSpPr>
+          <p:nvPr>
+            <p:ph type="sldImg"/>
+          </p:nvPr>
+        </p:nvSpPr>
+        <p:spPr/>
+      </p:sp>
+      <p:sp>
+        <p:nvSpPr>
+          <p:cNvPr id="3" name="Notes Placeholder 2"/>
+          <p:cNvSpPr>
+            <a:spLocks noGrp="1"/>
+          </p:cNvSpPr>
+          <p:nvPr>
+            <p:ph type="body" idx="1"/>
+          </p:nvPr>
+        </p:nvSpPr>
+        <p:spPr/>
+        <p:txBody>
+          <a:bodyPr/>
+          <a:lstStyle/>
+          <a:p>
+            <a:endParaRPr lang="en-US"/>
+          </a:p>
+        </p:txBody>
+      </p:sp>
+      <p:sp>
+        <p:nvSpPr>
+          <p:cNvPr id="4" name="Slide Number Placeholder 3"/>
+          <p:cNvSpPr>
+            <a:spLocks noGrp="1"/>
+          </p:cNvSpPr>
+          <p:nvPr>
+            <p:ph type="sldNum" sz="quarter" idx="10"/>
+          </p:nvPr>
+        </p:nvSpPr>
+        <p:spPr/>
+        <p:txBody>
+          <a:bodyPr/>
+          <a:lstStyle/>
+          <a:p>
+            <a:fld id="{69771C7D-C45A-4918-80C1-CE7F4A88DA47}" type="slidenum">
+              <a:rPr lang="en-US" smtClean="0"/>
+              <a:t>10</a:t>
+            </a:fld>
+            <a:endParaRPr lang="en-US"/>
+          </a:p>
+        </p:txBody>
+      </p:sp>
+    </p:spTree>
+    <p:extLst>
+      <p:ext uri="{BB962C8B-B14F-4D97-AF65-F5344CB8AC3E}">
+        <p14:creationId xmlns:p14="http://schemas.microsoft.com/office/powerpoint/2010/main" val="3305989205"/>
+      </p:ext>
+    </p:extLst>
+  </p:cSld>
+  <p:clrMapOvr>
+    <a:masterClrMapping/>
+  </p:clrMapOvr>
+</p:notes>
+</file>
+
 <file path=ppt/notesSlides/notesSlide2.xml><?xml version="1.0" encoding="utf-8"?>
 <p:notes xmlns:a="http://schemas.openxmlformats.org/drawingml/2006/main" xmlns:r="http://schemas.openxmlformats.org/officeDocument/2006/relationships" xmlns:p="http://schemas.openxmlformats.org/presentationml/2006/main">
   <p:cSld>
@@ -613,18 +697,8 @@
           <a:bodyPr/>
           <a:lstStyle/>
           <a:p>
-            <a:pPr marL="0" indent="0" algn="l">
-              <a:buNone/>
-            </a:pPr>
-            <a:r>
-              <a:rPr lang="en-US" sz="1200" kern="1200" dirty="0" smtClean="0">
-                <a:solidFill>
-                  <a:schemeClr val="tx1"/>
-                </a:solidFill>
-                <a:latin typeface="+mn-lt"/>
-                <a:ea typeface="+mn-ea"/>
-                <a:cs typeface="+mn-cs"/>
-              </a:rPr>
+            <a:r>
+              <a:rPr lang="en-US" dirty="0"/>
               <a:t>A unique value proposition (UVP) is a clear (concise) statement that describes the benefit you offer, how you solve your client’s needs and what distinguishes you from the competition.</a:t>
             </a:r>
           </a:p>
@@ -820,11 +894,7 @@
             </a:r>
             <a:r>
               <a:rPr lang="en-US" baseline="0" dirty="0" smtClean="0"/>
-              <a:t> is important.  Defining one’s value is HARD</a:t>
-            </a:r>
-            <a:r>
-              <a:rPr lang="en-US" baseline="0" dirty="0" smtClean="0"/>
-              <a:t>.</a:t>
+              <a:t> is important.  Defining one’s value is HARD.</a:t>
             </a:r>
           </a:p>
           <a:p>
@@ -919,21 +989,7 @@
           <a:bodyPr/>
           <a:lstStyle/>
           <a:p>
-            <a:pPr marL="0" marR="0" lvl="0" indent="0" algn="l" defTabSz="914400" rtl="0" eaLnBrk="1" fontAlgn="auto" latinLnBrk="0" hangingPunct="1">
-              <a:lnSpc>
-                <a:spcPct val="100000"/>
-              </a:lnSpc>
-              <a:spcBef>
-                <a:spcPts val="0"/>
-              </a:spcBef>
-              <a:spcAft>
-                <a:spcPts val="0"/>
-              </a:spcAft>
-              <a:buClrTx/>
-              <a:buSzTx/>
-              <a:buFontTx/>
-              <a:buNone/>
-              <a:tabLst/>
+            <a:pPr defTabSz="933237">
               <a:defRPr/>
             </a:pPr>
             <a:r>
@@ -942,50 +998,18 @@
             </a:r>
           </a:p>
           <a:p>
-            <a:pPr marL="0" marR="0" lvl="0" indent="0" algn="l" defTabSz="914400" rtl="0" eaLnBrk="1" fontAlgn="auto" latinLnBrk="0" hangingPunct="1">
-              <a:lnSpc>
-                <a:spcPct val="100000"/>
-              </a:lnSpc>
-              <a:spcBef>
-                <a:spcPts val="0"/>
-              </a:spcBef>
-              <a:spcAft>
-                <a:spcPts val="0"/>
-              </a:spcAft>
-              <a:buClrTx/>
-              <a:buSzTx/>
-              <a:buFontTx/>
-              <a:buNone/>
-              <a:tabLst/>
+            <a:pPr defTabSz="933237">
               <a:defRPr/>
             </a:pPr>
             <a:endParaRPr lang="en-US" baseline="0" dirty="0" smtClean="0"/>
           </a:p>
           <a:p>
-            <a:pPr marL="0" marR="0" lvl="0" indent="0" algn="l" defTabSz="914400" rtl="0" eaLnBrk="1" fontAlgn="auto" latinLnBrk="0" hangingPunct="1">
-              <a:lnSpc>
-                <a:spcPct val="100000"/>
-              </a:lnSpc>
-              <a:spcBef>
-                <a:spcPts val="0"/>
-              </a:spcBef>
-              <a:spcAft>
-                <a:spcPts val="0"/>
-              </a:spcAft>
-              <a:buClrTx/>
-              <a:buSzTx/>
-              <a:buFontTx/>
-              <a:buNone/>
-              <a:tabLst/>
+            <a:pPr defTabSz="933237">
               <a:defRPr/>
             </a:pPr>
             <a:r>
               <a:rPr lang="en-US" baseline="0" dirty="0" smtClean="0"/>
-              <a:t>Focus </a:t>
-            </a:r>
-            <a:r>
-              <a:rPr lang="en-US" baseline="0" dirty="0" smtClean="0"/>
-              <a:t>on a single segment of the market.  For example, my focus is PI’s and undergraduates.  </a:t>
+              <a:t>Focus on a single segment of the market.  For example, my focus is PI’s and undergraduates.  </a:t>
             </a:r>
           </a:p>
           <a:p>
@@ -1205,7 +1229,17 @@
           <a:p>
             <a:r>
               <a:rPr lang="en-US" baseline="0" dirty="0" smtClean="0"/>
-              <a:t>2. Only accept client’s whose problem aligns with your UVP.  Refer, Refer, Refer</a:t>
+              <a:t>2. Only accept client’s whose problem aligns with your UVP.  </a:t>
+            </a:r>
+            <a:endParaRPr lang="en-US" baseline="0" dirty="0" smtClean="0"/>
+          </a:p>
+          <a:p>
+            <a:endParaRPr lang="en-US" baseline="0" dirty="0" smtClean="0"/>
+          </a:p>
+          <a:p>
+            <a:r>
+              <a:rPr lang="en-US" baseline="0" dirty="0" smtClean="0"/>
+              <a:t>3. Decide where you want to play ball and where you want to lead – sometimes an organization needs to align to your values.</a:t>
             </a:r>
             <a:endParaRPr lang="en-US" dirty="0"/>
           </a:p>
@@ -1405,11 +1439,7 @@
             </a:r>
             <a:r>
               <a:rPr lang="en-US" baseline="0" dirty="0" smtClean="0"/>
-              <a:t> chances of developing clear, high-impact messages drops dramatically.  You become nothing more than noise in </a:t>
-            </a:r>
-            <a:r>
-              <a:rPr lang="en-US" baseline="0" dirty="0" smtClean="0"/>
-              <a:t>the competitive landscape.  </a:t>
+              <a:t> chances of developing clear, high-impact messages drops dramatically.  You become nothing more than noise in the competitive landscape.  </a:t>
             </a:r>
             <a:endParaRPr lang="en-US" dirty="0"/>
           </a:p>
@@ -5122,9 +5152,6 @@
               </a:rPr>
               <a:t>Define your Market</a:t>
             </a:r>
-            <a:endParaRPr lang="en-US" sz="7200" dirty="0" smtClean="0">
-              <a:latin typeface="+mj-lt"/>
-            </a:endParaRPr>
           </a:p>
           <a:p>
             <a:pPr marL="0" indent="0" algn="ctr">
@@ -5275,9 +5302,6 @@
               </a:rPr>
               <a:t>Identify your Expertise</a:t>
             </a:r>
-            <a:endParaRPr lang="en-US" sz="7200" dirty="0" smtClean="0">
-              <a:latin typeface="+mj-lt"/>
-            </a:endParaRPr>
           </a:p>
           <a:p>
             <a:pPr marL="0" indent="0" algn="ctr">
@@ -5428,9 +5452,6 @@
               </a:rPr>
               <a:t>Check Alignment</a:t>
             </a:r>
-            <a:endParaRPr lang="en-US" sz="7200" dirty="0" smtClean="0">
-              <a:latin typeface="+mj-lt"/>
-            </a:endParaRPr>
           </a:p>
           <a:p>
             <a:pPr marL="0" indent="0" algn="ctr">
@@ -5596,19 +5617,7 @@
               <a:rPr lang="en-US" sz="7200" dirty="0" smtClean="0">
                 <a:latin typeface="+mj-lt"/>
               </a:rPr>
-              <a:t>Everything Else</a:t>
-            </a:r>
-            <a:r>
-              <a:rPr lang="en-US" sz="7200" dirty="0" smtClean="0">
-                <a:latin typeface="+mj-lt"/>
-              </a:rPr>
-              <a:t> </a:t>
-            </a:r>
-            <a:r>
-              <a:rPr lang="en-US" sz="7200" dirty="0" smtClean="0">
-                <a:latin typeface="+mj-lt"/>
-              </a:rPr>
-              <a:t>(Second)</a:t>
+              <a:t>Everything Else (Second)</a:t>
             </a:r>
           </a:p>
           <a:p>

</xml_diff>